<commit_message>
delete 12 files, create 18 files, move 5 files, update 8 files and copy 2 files
</commit_message>
<xml_diff>
--- a/Slides/2 - Interfacce Utente/01 - Interfacce Utente - MVC.pptx
+++ b/Slides/2 - Interfacce Utente/01 - Interfacce Utente - MVC.pptx
@@ -7808,7 +7808,7 @@
             <a:tbl>
               <a:tblPr>
                 <a:noFill/>
-                <a:tableStyleId>{24468389-E63D-42DD-B9AC-A7A8EAD058D8}</a:tableStyleId>
+                <a:tableStyleId>{E7147F5D-D9B9-4FC0-B646-856C7271214B}</a:tableStyleId>
               </a:tblPr>
               <a:tblGrid>
                 <a:gridCol w="4667450"/>
@@ -13583,7 +13583,7 @@
             <a:tbl>
               <a:tblPr>
                 <a:noFill/>
-                <a:tableStyleId>{24468389-E63D-42DD-B9AC-A7A8EAD058D8}</a:tableStyleId>
+                <a:tableStyleId>{E7147F5D-D9B9-4FC0-B646-856C7271214B}</a:tableStyleId>
               </a:tblPr>
               <a:tblGrid>
                 <a:gridCol w="4667450"/>

</xml_diff>